<commit_message>
extended explaination of charts
</commit_message>
<xml_diff>
--- a/kubernetes/12_helm.pptx
+++ b/kubernetes/12_helm.pptx
@@ -5,19 +5,22 @@
     <p:sldMasterId id="2147483733" r:id="rId1"/>
   </p:sldMasterIdLst>
   <p:notesMasterIdLst>
-    <p:notesMasterId r:id="rId9"/>
+    <p:notesMasterId r:id="rId12"/>
   </p:notesMasterIdLst>
   <p:handoutMasterIdLst>
-    <p:handoutMasterId r:id="rId10"/>
+    <p:handoutMasterId r:id="rId13"/>
   </p:handoutMasterIdLst>
   <p:sldIdLst>
     <p:sldId id="433" r:id="rId2"/>
     <p:sldId id="442" r:id="rId3"/>
     <p:sldId id="445" r:id="rId4"/>
-    <p:sldId id="446" r:id="rId5"/>
-    <p:sldId id="447" r:id="rId6"/>
-    <p:sldId id="444" r:id="rId7"/>
-    <p:sldId id="265" r:id="rId8"/>
+    <p:sldId id="447" r:id="rId5"/>
+    <p:sldId id="444" r:id="rId6"/>
+    <p:sldId id="446" r:id="rId7"/>
+    <p:sldId id="449" r:id="rId8"/>
+    <p:sldId id="448" r:id="rId9"/>
+    <p:sldId id="450" r:id="rId10"/>
+    <p:sldId id="265" r:id="rId11"/>
   </p:sldIdLst>
   <p:sldSz cx="12195175" cy="6858000"/>
   <p:notesSz cx="6858000" cy="9144000"/>
@@ -882,11 +885,7 @@
           <a:p>
             <a:r>
               <a:rPr lang="en-US" dirty="0"/>
-              <a:t>Helm charts can be stored locally or in </a:t>
-            </a:r>
-            <a:r>
-              <a:rPr lang="en-US"/>
-              <a:t>a repository.</a:t>
+              <a:t>Helm charts can be stored locally or in a repository.</a:t>
             </a:r>
           </a:p>
         </p:txBody>
@@ -909,7 +908,7 @@
             <a:fld id="{7D8C2C35-2B8A-446E-BEC0-FD36716C29AC}" type="slidenum">
               <a:rPr lang="de-DE" smtClean="0"/>
               <a:pPr/>
-              <a:t>5</a:t>
+              <a:t>4</a:t>
             </a:fld>
             <a:endParaRPr lang="de-DE" dirty="0"/>
           </a:p>
@@ -947,6 +946,152 @@
       </p:grpSpPr>
       <p:sp>
         <p:nvSpPr>
+          <p:cNvPr id="2" name="Slide Image Placeholder 1"/>
+          <p:cNvSpPr>
+            <a:spLocks noGrp="1" noRot="1" noChangeAspect="1"/>
+          </p:cNvSpPr>
+          <p:nvPr>
+            <p:ph type="sldImg"/>
+          </p:nvPr>
+        </p:nvSpPr>
+        <p:spPr/>
+      </p:sp>
+      <p:sp>
+        <p:nvSpPr>
+          <p:cNvPr id="3" name="Notes Placeholder 2"/>
+          <p:cNvSpPr>
+            <a:spLocks noGrp="1"/>
+          </p:cNvSpPr>
+          <p:nvPr>
+            <p:ph type="body" idx="1"/>
+          </p:nvPr>
+        </p:nvSpPr>
+        <p:spPr/>
+        <p:txBody>
+          <a:bodyPr>
+            <a:normAutofit lnSpcReduction="10000"/>
+          </a:bodyPr>
+          <a:lstStyle/>
+          <a:p>
+            <a:pPr marL="0" marR="0" lvl="0" indent="0" algn="l" defTabSz="1088776" rtl="0" eaLnBrk="1" fontAlgn="auto" latinLnBrk="0" hangingPunct="1">
+              <a:lnSpc>
+                <a:spcPct val="100000"/>
+              </a:lnSpc>
+              <a:spcBef>
+                <a:spcPts val="0"/>
+              </a:spcBef>
+              <a:spcAft>
+                <a:spcPts val="0"/>
+              </a:spcAft>
+              <a:buClrTx/>
+              <a:buSzTx/>
+              <a:buFontTx/>
+              <a:buNone/>
+              <a:tabLst/>
+              <a:defRPr/>
+            </a:pPr>
+            <a:r>
+              <a:rPr lang="en-US" dirty="0"/>
+              <a:t>The power of helm lies within its templates and the ability to convert templates with values into valid </a:t>
+            </a:r>
+            <a:r>
+              <a:rPr lang="en-US" dirty="0" err="1"/>
+              <a:t>yaml</a:t>
+            </a:r>
+            <a:r>
+              <a:rPr lang="en-US" dirty="0"/>
+              <a:t> files. When authoring charts this is where most of your work will end up.</a:t>
+            </a:r>
+          </a:p>
+          <a:p>
+            <a:endParaRPr lang="en-US" dirty="0"/>
+          </a:p>
+          <a:p>
+            <a:r>
+              <a:rPr lang="en-US" dirty="0"/>
+              <a:t>So lets take a look at the template section of a chart. In our example there are 2 config map </a:t>
+            </a:r>
+            <a:r>
+              <a:rPr lang="en-US" dirty="0" err="1"/>
+              <a:t>yaml</a:t>
+            </a:r>
+            <a:r>
+              <a:rPr lang="en-US" dirty="0"/>
+              <a:t> files. One is pretty normal and works also without helm. However it is not very flexible. The 2</a:t>
+            </a:r>
+            <a:r>
+              <a:rPr lang="en-US" baseline="30000" dirty="0"/>
+              <a:t>nd</a:t>
+            </a:r>
+            <a:r>
+              <a:rPr lang="en-US" dirty="0"/>
+              <a:t> file contains references to helm variables – indicated by {{ }}. Helm renders the templates and converts them into valid </a:t>
+            </a:r>
+            <a:r>
+              <a:rPr lang="en-US" dirty="0" err="1"/>
+              <a:t>yaml</a:t>
+            </a:r>
+            <a:r>
+              <a:rPr lang="en-US" dirty="0"/>
+              <a:t>.</a:t>
+            </a:r>
+          </a:p>
+          <a:p>
+            <a:endParaRPr lang="en-US" dirty="0"/>
+          </a:p>
+          <a:p>
+            <a:r>
+              <a:rPr lang="en-US" dirty="0"/>
+              <a:t>There are build in variables .Release.* and custom values .Values.* . Additionally you can define functions and include / execute them. The definitions are stored in the _</a:t>
+            </a:r>
+            <a:r>
+              <a:rPr lang="en-US" dirty="0" err="1"/>
+              <a:t>helpers.tpl</a:t>
+            </a:r>
+            <a:r>
+              <a:rPr lang="en-US" dirty="0"/>
+              <a:t>. The demo-chart makes use of these, so take a look around there.</a:t>
+            </a:r>
+          </a:p>
+          <a:p>
+            <a:endParaRPr lang="en-US" dirty="0"/>
+          </a:p>
+          <a:p>
+            <a:r>
+              <a:rPr lang="en-US" dirty="0"/>
+              <a:t>To check, if the chart is ok, use “helm lint”. It will point out </a:t>
+            </a:r>
+            <a:r>
+              <a:rPr lang="en-US" dirty="0" err="1"/>
+              <a:t>yaml</a:t>
+            </a:r>
+            <a:r>
+              <a:rPr lang="en-US" dirty="0"/>
+              <a:t> errors and much more.</a:t>
+            </a:r>
+          </a:p>
+          <a:p>
+            <a:r>
+              <a:rPr lang="en-US" dirty="0"/>
+              <a:t>To check, how a chart would actually look like once deployed, use the --dry-run flag in combination with --debug</a:t>
+            </a:r>
+          </a:p>
+          <a:p>
+            <a:endParaRPr lang="en-US" dirty="0"/>
+          </a:p>
+          <a:p>
+            <a:endParaRPr lang="en-US" dirty="0"/>
+          </a:p>
+          <a:p>
+            <a:r>
+              <a:rPr lang="en-US" dirty="0"/>
+              <a:t>For details, check https://github.com/kubernetes/helm/tree/master/docs</a:t>
+            </a:r>
+          </a:p>
+        </p:txBody>
+      </p:sp>
+      <p:sp>
+        <p:nvSpPr>
           <p:cNvPr id="4" name="Slide Number Placeholder 3"/>
           <p:cNvSpPr>
             <a:spLocks noGrp="1"/>
@@ -961,9 +1106,148 @@
           <a:lstStyle/>
           <a:p>
             <a:fld id="{7D8C2C35-2B8A-446E-BEC0-FD36716C29AC}" type="slidenum">
+              <a:rPr lang="de-DE" smtClean="0"/>
+              <a:pPr/>
+              <a:t>8</a:t>
+            </a:fld>
+            <a:endParaRPr lang="de-DE" dirty="0"/>
+          </a:p>
+        </p:txBody>
+      </p:sp>
+    </p:spTree>
+    <p:extLst>
+      <p:ext uri="{BB962C8B-B14F-4D97-AF65-F5344CB8AC3E}">
+        <p14:creationId xmlns:p14="http://schemas.microsoft.com/office/powerpoint/2010/main" val="2708650554"/>
+      </p:ext>
+    </p:extLst>
+  </p:cSld>
+  <p:clrMapOvr>
+    <a:masterClrMapping/>
+  </p:clrMapOvr>
+</p:notes>
+</file>
+
+<file path=ppt/notesSlides/notesSlide6.xml><?xml version="1.0" encoding="utf-8"?>
+<p:notes xmlns:a="http://schemas.openxmlformats.org/drawingml/2006/main" xmlns:r="http://schemas.openxmlformats.org/officeDocument/2006/relationships" xmlns:p="http://schemas.openxmlformats.org/presentationml/2006/main">
+  <p:cSld>
+    <p:spTree>
+      <p:nvGrpSpPr>
+        <p:cNvPr id="1" name=""/>
+        <p:cNvGrpSpPr/>
+        <p:nvPr/>
+      </p:nvGrpSpPr>
+      <p:grpSpPr>
+        <a:xfrm>
+          <a:off x="0" y="0"/>
+          <a:ext cx="0" cy="0"/>
+          <a:chOff x="0" y="0"/>
+          <a:chExt cx="0" cy="0"/>
+        </a:xfrm>
+      </p:grpSpPr>
+      <p:sp>
+        <p:nvSpPr>
+          <p:cNvPr id="2" name="Slide Image Placeholder 1"/>
+          <p:cNvSpPr>
+            <a:spLocks noGrp="1" noRot="1" noChangeAspect="1"/>
+          </p:cNvSpPr>
+          <p:nvPr>
+            <p:ph type="sldImg"/>
+          </p:nvPr>
+        </p:nvSpPr>
+        <p:spPr/>
+      </p:sp>
+      <p:sp>
+        <p:nvSpPr>
+          <p:cNvPr id="3" name="Notes Placeholder 2"/>
+          <p:cNvSpPr>
+            <a:spLocks noGrp="1"/>
+          </p:cNvSpPr>
+          <p:nvPr>
+            <p:ph type="body" idx="1"/>
+          </p:nvPr>
+        </p:nvSpPr>
+        <p:spPr/>
+        <p:txBody>
+          <a:bodyPr/>
+          <a:lstStyle/>
+          <a:p>
+            <a:endParaRPr lang="en-US" dirty="0"/>
+          </a:p>
+        </p:txBody>
+      </p:sp>
+      <p:sp>
+        <p:nvSpPr>
+          <p:cNvPr id="4" name="Slide Number Placeholder 3"/>
+          <p:cNvSpPr>
+            <a:spLocks noGrp="1"/>
+          </p:cNvSpPr>
+          <p:nvPr>
+            <p:ph type="sldNum" sz="quarter" idx="10"/>
+          </p:nvPr>
+        </p:nvSpPr>
+        <p:spPr/>
+        <p:txBody>
+          <a:bodyPr/>
+          <a:lstStyle/>
+          <a:p>
+            <a:fld id="{7D8C2C35-2B8A-446E-BEC0-FD36716C29AC}" type="slidenum">
+              <a:rPr lang="de-DE" smtClean="0"/>
+              <a:pPr/>
+              <a:t>9</a:t>
+            </a:fld>
+            <a:endParaRPr lang="de-DE" dirty="0"/>
+          </a:p>
+        </p:txBody>
+      </p:sp>
+    </p:spTree>
+    <p:extLst>
+      <p:ext uri="{BB962C8B-B14F-4D97-AF65-F5344CB8AC3E}">
+        <p14:creationId xmlns:p14="http://schemas.microsoft.com/office/powerpoint/2010/main" val="437231904"/>
+      </p:ext>
+    </p:extLst>
+  </p:cSld>
+  <p:clrMapOvr>
+    <a:masterClrMapping/>
+  </p:clrMapOvr>
+</p:notes>
+</file>
+
+<file path=ppt/notesSlides/notesSlide7.xml><?xml version="1.0" encoding="utf-8"?>
+<p:notes xmlns:a="http://schemas.openxmlformats.org/drawingml/2006/main" xmlns:r="http://schemas.openxmlformats.org/officeDocument/2006/relationships" xmlns:p="http://schemas.openxmlformats.org/presentationml/2006/main">
+  <p:cSld>
+    <p:spTree>
+      <p:nvGrpSpPr>
+        <p:cNvPr id="1" name=""/>
+        <p:cNvGrpSpPr/>
+        <p:nvPr/>
+      </p:nvGrpSpPr>
+      <p:grpSpPr>
+        <a:xfrm>
+          <a:off x="0" y="0"/>
+          <a:ext cx="0" cy="0"/>
+          <a:chOff x="0" y="0"/>
+          <a:chExt cx="0" cy="0"/>
+        </a:xfrm>
+      </p:grpSpPr>
+      <p:sp>
+        <p:nvSpPr>
+          <p:cNvPr id="4" name="Slide Number Placeholder 3"/>
+          <p:cNvSpPr>
+            <a:spLocks noGrp="1"/>
+          </p:cNvSpPr>
+          <p:nvPr>
+            <p:ph type="sldNum" sz="quarter" idx="10"/>
+          </p:nvPr>
+        </p:nvSpPr>
+        <p:spPr/>
+        <p:txBody>
+          <a:bodyPr/>
+          <a:lstStyle/>
+          <a:p>
+            <a:fld id="{7D8C2C35-2B8A-446E-BEC0-FD36716C29AC}" type="slidenum">
               <a:rPr lang="en-US" smtClean="0"/>
               <a:pPr/>
-              <a:t>7</a:t>
+              <a:t>10</a:t>
             </a:fld>
             <a:endParaRPr lang="en-US" dirty="0"/>
           </a:p>
@@ -14384,6 +14668,32 @@
 </p:sld>
 </file>
 
+<file path=ppt/slides/slide10.xml><?xml version="1.0" encoding="utf-8"?>
+<p:sld xmlns:a="http://schemas.openxmlformats.org/drawingml/2006/main" xmlns:r="http://schemas.openxmlformats.org/officeDocument/2006/relationships" xmlns:p="http://schemas.openxmlformats.org/presentationml/2006/main" show="0">
+  <p:cSld>
+    <p:spTree>
+      <p:nvGrpSpPr>
+        <p:cNvPr id="1" name=""/>
+        <p:cNvGrpSpPr/>
+        <p:nvPr/>
+      </p:nvGrpSpPr>
+      <p:grpSpPr>
+        <a:xfrm>
+          <a:off x="0" y="0"/>
+          <a:ext cx="0" cy="0"/>
+          <a:chOff x="0" y="0"/>
+          <a:chExt cx="0" cy="0"/>
+        </a:xfrm>
+      </p:grpSpPr>
+    </p:spTree>
+  </p:cSld>
+  <p:clrMapOvr>
+    <a:masterClrMapping/>
+  </p:clrMapOvr>
+  <p:transition spd="med"/>
+</p:sld>
+</file>
+
 <file path=ppt/slides/slide2.xml><?xml version="1.0" encoding="utf-8"?>
 <p:sld xmlns:a="http://schemas.openxmlformats.org/drawingml/2006/main" xmlns:r="http://schemas.openxmlformats.org/officeDocument/2006/relationships" xmlns:p="http://schemas.openxmlformats.org/presentationml/2006/main">
   <p:cSld>
@@ -14448,7 +14758,7 @@
             </a:pPr>
             <a:r>
               <a:rPr lang="en-US" dirty="0"/>
-              <a:t>Designed to manage applications with several isolated components</a:t>
+              <a:t>Helm combines templates and values to convert them into valid k8s resources</a:t>
             </a:r>
           </a:p>
           <a:p>
@@ -14458,7 +14768,7 @@
             </a:pPr>
             <a:r>
               <a:rPr lang="en-US" dirty="0"/>
-              <a:t>Supports “release management” with updates &amp; roll-backs</a:t>
+              <a:t>Designed to manage applications with several components</a:t>
             </a:r>
           </a:p>
           <a:p>
@@ -16171,169 +16481,6 @@
           <a:p>
             <a:r>
               <a:rPr lang="en-US" dirty="0"/>
-              <a:t>Helm charts</a:t>
-            </a:r>
-          </a:p>
-        </p:txBody>
-      </p:sp>
-      <p:sp>
-        <p:nvSpPr>
-          <p:cNvPr id="3" name="Rectangle 2"/>
-          <p:cNvSpPr/>
-          <p:nvPr/>
-        </p:nvSpPr>
-        <p:spPr>
-          <a:xfrm>
-            <a:off x="504000" y="1223190"/>
-            <a:ext cx="10842180" cy="3000821"/>
-          </a:xfrm>
-          <a:prstGeom prst="rect">
-            <a:avLst/>
-          </a:prstGeom>
-        </p:spPr>
-        <p:txBody>
-          <a:bodyPr wrap="square">
-            <a:spAutoFit/>
-          </a:bodyPr>
-          <a:lstStyle/>
-          <a:p>
-            <a:pPr marL="342900" indent="-342900">
-              <a:buFont typeface="Wingdings" panose="05000000000000000000" pitchFamily="2" charset="2"/>
-              <a:buChar char="§"/>
-            </a:pPr>
-            <a:r>
-              <a:rPr lang="en-US" dirty="0"/>
-              <a:t>Packages of predefined, parameterized K8s resources are called “charts”</a:t>
-            </a:r>
-          </a:p>
-          <a:p>
-            <a:pPr marL="342900" indent="-342900">
-              <a:buFont typeface="Wingdings" panose="05000000000000000000" pitchFamily="2" charset="2"/>
-              <a:buChar char="§"/>
-            </a:pPr>
-            <a:endParaRPr lang="en-US" dirty="0"/>
-          </a:p>
-          <a:p>
-            <a:r>
-              <a:rPr lang="en-US" dirty="0" err="1"/>
-              <a:t>wordpress</a:t>
-            </a:r>
-            <a:r>
-              <a:rPr lang="en-US" dirty="0"/>
-              <a:t>/</a:t>
-            </a:r>
-          </a:p>
-          <a:p>
-            <a:pPr marL="342900" indent="-342900">
-              <a:buFont typeface="Wingdings" panose="05000000000000000000" pitchFamily="2" charset="2"/>
-              <a:buChar char="§"/>
-            </a:pPr>
-            <a:r>
-              <a:rPr lang="en-US" dirty="0" err="1"/>
-              <a:t>Chart.yaml</a:t>
-            </a:r>
-            <a:r>
-              <a:rPr lang="en-US" dirty="0"/>
-              <a:t> - A file containing information about the chart</a:t>
-            </a:r>
-          </a:p>
-          <a:p>
-            <a:pPr marL="342900" indent="-342900">
-              <a:buFont typeface="Wingdings" panose="05000000000000000000" pitchFamily="2" charset="2"/>
-              <a:buChar char="§"/>
-            </a:pPr>
-            <a:r>
-              <a:rPr lang="en-US" dirty="0" err="1"/>
-              <a:t>requirements.yaml</a:t>
-            </a:r>
-            <a:r>
-              <a:rPr lang="en-US" dirty="0"/>
-              <a:t> - A file listing dependencies for the chart</a:t>
-            </a:r>
-          </a:p>
-          <a:p>
-            <a:pPr marL="342900" indent="-342900">
-              <a:buFont typeface="Wingdings" panose="05000000000000000000" pitchFamily="2" charset="2"/>
-              <a:buChar char="§"/>
-            </a:pPr>
-            <a:r>
-              <a:rPr lang="en-US" dirty="0" err="1"/>
-              <a:t>values.yaml</a:t>
-            </a:r>
-            <a:r>
-              <a:rPr lang="en-US" dirty="0"/>
-              <a:t> - The default configuration values for this chart</a:t>
-            </a:r>
-          </a:p>
-          <a:p>
-            <a:pPr marL="342900" indent="-342900">
-              <a:buFont typeface="Wingdings" panose="05000000000000000000" pitchFamily="2" charset="2"/>
-              <a:buChar char="§"/>
-            </a:pPr>
-            <a:r>
-              <a:rPr lang="en-US" dirty="0"/>
-              <a:t>charts/ - A directory containing any charts upon which this chart depends.</a:t>
-            </a:r>
-          </a:p>
-          <a:p>
-            <a:pPr marL="342900" indent="-342900">
-              <a:buFont typeface="Wingdings" panose="05000000000000000000" pitchFamily="2" charset="2"/>
-              <a:buChar char="§"/>
-            </a:pPr>
-            <a:r>
-              <a:rPr lang="en-US" dirty="0"/>
-              <a:t>templates/ - A directory of templates that, when combined with values, will generate valid Kubernetes manifest files.</a:t>
-            </a:r>
-          </a:p>
-        </p:txBody>
-      </p:sp>
-    </p:spTree>
-    <p:extLst>
-      <p:ext uri="{BB962C8B-B14F-4D97-AF65-F5344CB8AC3E}">
-        <p14:creationId xmlns:p14="http://schemas.microsoft.com/office/powerpoint/2010/main" val="764019977"/>
-      </p:ext>
-    </p:extLst>
-  </p:cSld>
-  <p:clrMapOvr>
-    <a:masterClrMapping/>
-  </p:clrMapOvr>
-</p:sld>
-</file>
-
-<file path=ppt/slides/slide5.xml><?xml version="1.0" encoding="utf-8"?>
-<p:sld xmlns:a="http://schemas.openxmlformats.org/drawingml/2006/main" xmlns:r="http://schemas.openxmlformats.org/officeDocument/2006/relationships" xmlns:p="http://schemas.openxmlformats.org/presentationml/2006/main">
-  <p:cSld>
-    <p:spTree>
-      <p:nvGrpSpPr>
-        <p:cNvPr id="1" name=""/>
-        <p:cNvGrpSpPr/>
-        <p:nvPr/>
-      </p:nvGrpSpPr>
-      <p:grpSpPr>
-        <a:xfrm>
-          <a:off x="0" y="0"/>
-          <a:ext cx="0" cy="0"/>
-          <a:chOff x="0" y="0"/>
-          <a:chExt cx="0" cy="0"/>
-        </a:xfrm>
-      </p:grpSpPr>
-      <p:sp>
-        <p:nvSpPr>
-          <p:cNvPr id="2" name="Title 1"/>
-          <p:cNvSpPr>
-            <a:spLocks noGrp="1"/>
-          </p:cNvSpPr>
-          <p:nvPr>
-            <p:ph type="title"/>
-          </p:nvPr>
-        </p:nvSpPr>
-        <p:spPr/>
-        <p:txBody>
-          <a:bodyPr/>
-          <a:lstStyle/>
-          <a:p>
-            <a:r>
-              <a:rPr lang="en-US" dirty="0"/>
               <a:t>Working with helm</a:t>
             </a:r>
           </a:p>
@@ -17707,7 +17854,7 @@
 </p:sld>
 </file>
 
-<file path=ppt/slides/slide6.xml><?xml version="1.0" encoding="utf-8"?>
+<file path=ppt/slides/slide5.xml><?xml version="1.0" encoding="utf-8"?>
 <p:sld xmlns:a="http://schemas.openxmlformats.org/drawingml/2006/main" xmlns:r="http://schemas.openxmlformats.org/officeDocument/2006/relationships" xmlns:p="http://schemas.openxmlformats.org/presentationml/2006/main" show="0">
   <p:cSld>
     <p:spTree>
@@ -17835,6 +17982,226 @@
 </p:sld>
 </file>
 
+<file path=ppt/slides/slide6.xml><?xml version="1.0" encoding="utf-8"?>
+<p:sld xmlns:a="http://schemas.openxmlformats.org/drawingml/2006/main" xmlns:r="http://schemas.openxmlformats.org/officeDocument/2006/relationships" xmlns:p="http://schemas.openxmlformats.org/presentationml/2006/main">
+  <p:cSld>
+    <p:spTree>
+      <p:nvGrpSpPr>
+        <p:cNvPr id="1" name=""/>
+        <p:cNvGrpSpPr/>
+        <p:nvPr/>
+      </p:nvGrpSpPr>
+      <p:grpSpPr>
+        <a:xfrm>
+          <a:off x="0" y="0"/>
+          <a:ext cx="0" cy="0"/>
+          <a:chOff x="0" y="0"/>
+          <a:chExt cx="0" cy="0"/>
+        </a:xfrm>
+      </p:grpSpPr>
+      <p:sp>
+        <p:nvSpPr>
+          <p:cNvPr id="2" name="Title 1"/>
+          <p:cNvSpPr>
+            <a:spLocks noGrp="1"/>
+          </p:cNvSpPr>
+          <p:nvPr>
+            <p:ph type="title"/>
+          </p:nvPr>
+        </p:nvSpPr>
+        <p:spPr/>
+        <p:txBody>
+          <a:bodyPr/>
+          <a:lstStyle/>
+          <a:p>
+            <a:r>
+              <a:rPr lang="en-US" dirty="0"/>
+              <a:t>Authoring helm charts</a:t>
+            </a:r>
+          </a:p>
+        </p:txBody>
+      </p:sp>
+      <p:pic>
+        <p:nvPicPr>
+          <p:cNvPr id="4" name="Picture 3">
+            <a:extLst>
+              <a:ext uri="{FF2B5EF4-FFF2-40B4-BE49-F238E27FC236}">
+                <a16:creationId xmlns:a16="http://schemas.microsoft.com/office/drawing/2014/main" id="{BD625C01-15F0-497E-B1CD-8AB18852298E}"/>
+              </a:ext>
+            </a:extLst>
+          </p:cNvPr>
+          <p:cNvPicPr>
+            <a:picLocks noChangeAspect="1"/>
+          </p:cNvPicPr>
+          <p:nvPr/>
+        </p:nvPicPr>
+        <p:blipFill>
+          <a:blip r:embed="rId2"/>
+          <a:stretch>
+            <a:fillRect/>
+          </a:stretch>
+        </p:blipFill>
+        <p:spPr>
+          <a:xfrm>
+            <a:off x="6664690" y="688666"/>
+            <a:ext cx="4121394" cy="5495192"/>
+          </a:xfrm>
+          <a:prstGeom prst="rect">
+            <a:avLst/>
+          </a:prstGeom>
+        </p:spPr>
+      </p:pic>
+      <p:sp>
+        <p:nvSpPr>
+          <p:cNvPr id="6" name="Rectangle 5">
+            <a:extLst>
+              <a:ext uri="{FF2B5EF4-FFF2-40B4-BE49-F238E27FC236}">
+                <a16:creationId xmlns:a16="http://schemas.microsoft.com/office/drawing/2014/main" id="{31A48861-B72C-49CA-BB50-789DAEC7F1C4}"/>
+              </a:ext>
+            </a:extLst>
+          </p:cNvPr>
+          <p:cNvSpPr/>
+          <p:nvPr/>
+        </p:nvSpPr>
+        <p:spPr>
+          <a:xfrm>
+            <a:off x="504001" y="1390244"/>
+            <a:ext cx="5975930" cy="4293483"/>
+          </a:xfrm>
+          <a:prstGeom prst="rect">
+            <a:avLst/>
+          </a:prstGeom>
+        </p:spPr>
+        <p:txBody>
+          <a:bodyPr wrap="square">
+            <a:spAutoFit/>
+          </a:bodyPr>
+          <a:lstStyle/>
+          <a:p>
+            <a:pPr marL="342900" indent="-342900">
+              <a:buFont typeface="Wingdings" panose="05000000000000000000" pitchFamily="2" charset="2"/>
+              <a:buChar char="§"/>
+            </a:pPr>
+            <a:r>
+              <a:rPr lang="en-US" dirty="0"/>
+              <a:t>Packages in the helm eco system are called “charts”</a:t>
+            </a:r>
+          </a:p>
+          <a:p>
+            <a:pPr marL="342900" indent="-342900">
+              <a:buFont typeface="Wingdings" panose="05000000000000000000" pitchFamily="2" charset="2"/>
+              <a:buChar char="§"/>
+            </a:pPr>
+            <a:endParaRPr lang="en-US" dirty="0"/>
+          </a:p>
+          <a:p>
+            <a:r>
+              <a:rPr lang="en-US" dirty="0" err="1"/>
+              <a:t>wordpress</a:t>
+            </a:r>
+            <a:r>
+              <a:rPr lang="en-US" dirty="0"/>
+              <a:t>/</a:t>
+            </a:r>
+          </a:p>
+          <a:p>
+            <a:pPr marL="342900" indent="-342900">
+              <a:buFont typeface="Wingdings" panose="05000000000000000000" pitchFamily="2" charset="2"/>
+              <a:buChar char="§"/>
+            </a:pPr>
+            <a:r>
+              <a:rPr lang="en-US" dirty="0" err="1"/>
+              <a:t>Chart.yaml</a:t>
+            </a:r>
+            <a:r>
+              <a:rPr lang="en-US" dirty="0"/>
+              <a:t> </a:t>
+            </a:r>
+          </a:p>
+          <a:p>
+            <a:pPr marL="342900" indent="-342900">
+              <a:buFont typeface="Wingdings" panose="05000000000000000000" pitchFamily="2" charset="2"/>
+              <a:buChar char="§"/>
+            </a:pPr>
+            <a:r>
+              <a:rPr lang="en-US" dirty="0" err="1"/>
+              <a:t>requirements.yaml</a:t>
+            </a:r>
+            <a:endParaRPr lang="en-US" dirty="0"/>
+          </a:p>
+          <a:p>
+            <a:pPr marL="342900" indent="-342900">
+              <a:buFont typeface="Wingdings" panose="05000000000000000000" pitchFamily="2" charset="2"/>
+              <a:buChar char="§"/>
+            </a:pPr>
+            <a:r>
+              <a:rPr lang="en-US" dirty="0" err="1"/>
+              <a:t>values.yaml</a:t>
+            </a:r>
+            <a:endParaRPr lang="en-US" dirty="0"/>
+          </a:p>
+          <a:p>
+            <a:pPr marL="342900" indent="-342900">
+              <a:buFont typeface="Wingdings" panose="05000000000000000000" pitchFamily="2" charset="2"/>
+              <a:buChar char="§"/>
+            </a:pPr>
+            <a:r>
+              <a:rPr lang="en-US" dirty="0"/>
+              <a:t>charts/ </a:t>
+            </a:r>
+          </a:p>
+          <a:p>
+            <a:pPr marL="342900" indent="-342900">
+              <a:buFont typeface="Wingdings" panose="05000000000000000000" pitchFamily="2" charset="2"/>
+              <a:buChar char="§"/>
+            </a:pPr>
+            <a:r>
+              <a:rPr lang="en-US" dirty="0"/>
+              <a:t>templates/</a:t>
+            </a:r>
+          </a:p>
+          <a:p>
+            <a:pPr marL="342900" indent="-342900">
+              <a:buFont typeface="Wingdings" panose="05000000000000000000" pitchFamily="2" charset="2"/>
+              <a:buChar char="§"/>
+            </a:pPr>
+            <a:endParaRPr lang="en-US" dirty="0"/>
+          </a:p>
+          <a:p>
+            <a:pPr marL="342900" indent="-342900">
+              <a:buFont typeface="Wingdings" panose="05000000000000000000" pitchFamily="2" charset="2"/>
+              <a:buChar char="§"/>
+            </a:pPr>
+            <a:r>
+              <a:rPr lang="en-US" dirty="0"/>
+              <a:t>Templates contain variables</a:t>
+            </a:r>
+          </a:p>
+          <a:p>
+            <a:pPr marL="342900" indent="-342900">
+              <a:buFont typeface="Wingdings" panose="05000000000000000000" pitchFamily="2" charset="2"/>
+              <a:buChar char="§"/>
+            </a:pPr>
+            <a:r>
+              <a:rPr lang="en-US" dirty="0"/>
+              <a:t>Helm renders charts during deployment and substitutes variables with values</a:t>
+            </a:r>
+          </a:p>
+        </p:txBody>
+      </p:sp>
+    </p:spTree>
+    <p:extLst>
+      <p:ext uri="{BB962C8B-B14F-4D97-AF65-F5344CB8AC3E}">
+        <p14:creationId xmlns:p14="http://schemas.microsoft.com/office/powerpoint/2010/main" val="764019977"/>
+      </p:ext>
+    </p:extLst>
+  </p:cSld>
+  <p:clrMapOvr>
+    <a:masterClrMapping/>
+  </p:clrMapOvr>
+</p:sld>
+</file>
+
 <file path=ppt/slides/slide7.xml><?xml version="1.0" encoding="utf-8"?>
 <p:sld xmlns:a="http://schemas.openxmlformats.org/drawingml/2006/main" xmlns:r="http://schemas.openxmlformats.org/officeDocument/2006/relationships" xmlns:p="http://schemas.openxmlformats.org/presentationml/2006/main" show="0">
   <p:cSld>
@@ -17852,12 +18219,916 @@
           <a:chExt cx="0" cy="0"/>
         </a:xfrm>
       </p:grpSpPr>
+      <p:sp>
+        <p:nvSpPr>
+          <p:cNvPr id="2" name="Title 1"/>
+          <p:cNvSpPr>
+            <a:spLocks noGrp="1"/>
+          </p:cNvSpPr>
+          <p:nvPr>
+            <p:ph type="title"/>
+          </p:nvPr>
+        </p:nvSpPr>
+        <p:spPr/>
+        <p:txBody>
+          <a:bodyPr/>
+          <a:lstStyle/>
+          <a:p>
+            <a:r>
+              <a:rPr lang="en-US" dirty="0"/>
+              <a:t>Helm charts</a:t>
+            </a:r>
+          </a:p>
+        </p:txBody>
+      </p:sp>
+      <p:sp>
+        <p:nvSpPr>
+          <p:cNvPr id="3" name="Rectangle 2"/>
+          <p:cNvSpPr/>
+          <p:nvPr/>
+        </p:nvSpPr>
+        <p:spPr>
+          <a:xfrm>
+            <a:off x="504000" y="1223190"/>
+            <a:ext cx="10842180" cy="3000821"/>
+          </a:xfrm>
+          <a:prstGeom prst="rect">
+            <a:avLst/>
+          </a:prstGeom>
+        </p:spPr>
+        <p:txBody>
+          <a:bodyPr wrap="square">
+            <a:spAutoFit/>
+          </a:bodyPr>
+          <a:lstStyle/>
+          <a:p>
+            <a:pPr marL="342900" indent="-342900">
+              <a:buFont typeface="Wingdings" panose="05000000000000000000" pitchFamily="2" charset="2"/>
+              <a:buChar char="§"/>
+            </a:pPr>
+            <a:r>
+              <a:rPr lang="en-US" dirty="0"/>
+              <a:t>Packages of predefined, parameterized K8s resources are called “charts”</a:t>
+            </a:r>
+          </a:p>
+          <a:p>
+            <a:pPr marL="342900" indent="-342900">
+              <a:buFont typeface="Wingdings" panose="05000000000000000000" pitchFamily="2" charset="2"/>
+              <a:buChar char="§"/>
+            </a:pPr>
+            <a:endParaRPr lang="en-US" dirty="0"/>
+          </a:p>
+          <a:p>
+            <a:r>
+              <a:rPr lang="en-US" dirty="0" err="1"/>
+              <a:t>wordpress</a:t>
+            </a:r>
+            <a:r>
+              <a:rPr lang="en-US" dirty="0"/>
+              <a:t>/</a:t>
+            </a:r>
+          </a:p>
+          <a:p>
+            <a:pPr marL="342900" indent="-342900">
+              <a:buFont typeface="Wingdings" panose="05000000000000000000" pitchFamily="2" charset="2"/>
+              <a:buChar char="§"/>
+            </a:pPr>
+            <a:r>
+              <a:rPr lang="en-US" dirty="0" err="1"/>
+              <a:t>Chart.yaml</a:t>
+            </a:r>
+            <a:r>
+              <a:rPr lang="en-US" dirty="0"/>
+              <a:t> - A file containing information about the chart</a:t>
+            </a:r>
+          </a:p>
+          <a:p>
+            <a:pPr marL="342900" indent="-342900">
+              <a:buFont typeface="Wingdings" panose="05000000000000000000" pitchFamily="2" charset="2"/>
+              <a:buChar char="§"/>
+            </a:pPr>
+            <a:r>
+              <a:rPr lang="en-US" dirty="0" err="1"/>
+              <a:t>requirements.yaml</a:t>
+            </a:r>
+            <a:r>
+              <a:rPr lang="en-US" dirty="0"/>
+              <a:t> - A file listing dependencies for the chart</a:t>
+            </a:r>
+          </a:p>
+          <a:p>
+            <a:pPr marL="342900" indent="-342900">
+              <a:buFont typeface="Wingdings" panose="05000000000000000000" pitchFamily="2" charset="2"/>
+              <a:buChar char="§"/>
+            </a:pPr>
+            <a:r>
+              <a:rPr lang="en-US" dirty="0" err="1"/>
+              <a:t>values.yaml</a:t>
+            </a:r>
+            <a:r>
+              <a:rPr lang="en-US" dirty="0"/>
+              <a:t> - The default configuration values for this chart</a:t>
+            </a:r>
+          </a:p>
+          <a:p>
+            <a:pPr marL="342900" indent="-342900">
+              <a:buFont typeface="Wingdings" panose="05000000000000000000" pitchFamily="2" charset="2"/>
+              <a:buChar char="§"/>
+            </a:pPr>
+            <a:r>
+              <a:rPr lang="en-US" dirty="0"/>
+              <a:t>charts/ - A directory containing any charts upon which this chart depends.</a:t>
+            </a:r>
+          </a:p>
+          <a:p>
+            <a:pPr marL="342900" indent="-342900">
+              <a:buFont typeface="Wingdings" panose="05000000000000000000" pitchFamily="2" charset="2"/>
+              <a:buChar char="§"/>
+            </a:pPr>
+            <a:r>
+              <a:rPr lang="en-US" dirty="0"/>
+              <a:t>templates/ - A directory of templates that, when combined with values, will generate valid Kubernetes manifest files.</a:t>
+            </a:r>
+          </a:p>
+        </p:txBody>
+      </p:sp>
     </p:spTree>
+    <p:extLst>
+      <p:ext uri="{BB962C8B-B14F-4D97-AF65-F5344CB8AC3E}">
+        <p14:creationId xmlns:p14="http://schemas.microsoft.com/office/powerpoint/2010/main" val="3054274610"/>
+      </p:ext>
+    </p:extLst>
   </p:cSld>
   <p:clrMapOvr>
     <a:masterClrMapping/>
   </p:clrMapOvr>
-  <p:transition spd="med"/>
+</p:sld>
+</file>
+
+<file path=ppt/slides/slide8.xml><?xml version="1.0" encoding="utf-8"?>
+<p:sld xmlns:a="http://schemas.openxmlformats.org/drawingml/2006/main" xmlns:r="http://schemas.openxmlformats.org/officeDocument/2006/relationships" xmlns:p="http://schemas.openxmlformats.org/presentationml/2006/main">
+  <p:cSld>
+    <p:spTree>
+      <p:nvGrpSpPr>
+        <p:cNvPr id="1" name=""/>
+        <p:cNvGrpSpPr/>
+        <p:nvPr/>
+      </p:nvGrpSpPr>
+      <p:grpSpPr>
+        <a:xfrm>
+          <a:off x="0" y="0"/>
+          <a:ext cx="0" cy="0"/>
+          <a:chOff x="0" y="0"/>
+          <a:chExt cx="0" cy="0"/>
+        </a:xfrm>
+      </p:grpSpPr>
+      <p:pic>
+        <p:nvPicPr>
+          <p:cNvPr id="17" name="Picture 16">
+            <a:extLst>
+              <a:ext uri="{FF2B5EF4-FFF2-40B4-BE49-F238E27FC236}">
+                <a16:creationId xmlns:a16="http://schemas.microsoft.com/office/drawing/2014/main" id="{2464FB82-4E81-4F54-9EF8-4A36ED3B8045}"/>
+              </a:ext>
+            </a:extLst>
+          </p:cNvPr>
+          <p:cNvPicPr>
+            <a:picLocks noChangeAspect="1"/>
+          </p:cNvPicPr>
+          <p:nvPr/>
+        </p:nvPicPr>
+        <p:blipFill>
+          <a:blip r:embed="rId3"/>
+          <a:stretch>
+            <a:fillRect/>
+          </a:stretch>
+        </p:blipFill>
+        <p:spPr>
+          <a:xfrm>
+            <a:off x="504001" y="1692328"/>
+            <a:ext cx="4095238" cy="3923809"/>
+          </a:xfrm>
+          <a:prstGeom prst="rect">
+            <a:avLst/>
+          </a:prstGeom>
+        </p:spPr>
+      </p:pic>
+      <p:sp>
+        <p:nvSpPr>
+          <p:cNvPr id="4" name="Title 3">
+            <a:extLst>
+              <a:ext uri="{FF2B5EF4-FFF2-40B4-BE49-F238E27FC236}">
+                <a16:creationId xmlns:a16="http://schemas.microsoft.com/office/drawing/2014/main" id="{2C20A3A3-5BE1-4DB7-9A60-49901FC75E7B}"/>
+              </a:ext>
+            </a:extLst>
+          </p:cNvPr>
+          <p:cNvSpPr>
+            <a:spLocks noGrp="1"/>
+          </p:cNvSpPr>
+          <p:nvPr>
+            <p:ph type="title"/>
+          </p:nvPr>
+        </p:nvSpPr>
+        <p:spPr>
+          <a:xfrm>
+            <a:off x="504001" y="504000"/>
+            <a:ext cx="11186476" cy="369332"/>
+          </a:xfrm>
+        </p:spPr>
+        <p:txBody>
+          <a:bodyPr/>
+          <a:lstStyle/>
+          <a:p>
+            <a:r>
+              <a:rPr lang="en-US" dirty="0"/>
+              <a:t>About writing templates</a:t>
+            </a:r>
+          </a:p>
+        </p:txBody>
+      </p:sp>
+      <p:sp>
+        <p:nvSpPr>
+          <p:cNvPr id="16" name="Speech Bubble: Rectangle 15">
+            <a:extLst>
+              <a:ext uri="{FF2B5EF4-FFF2-40B4-BE49-F238E27FC236}">
+                <a16:creationId xmlns:a16="http://schemas.microsoft.com/office/drawing/2014/main" id="{78F9BA3B-EB94-4AC8-920D-A9ED83D0D2E2}"/>
+              </a:ext>
+            </a:extLst>
+          </p:cNvPr>
+          <p:cNvSpPr/>
+          <p:nvPr/>
+        </p:nvSpPr>
+        <p:spPr bwMode="gray">
+          <a:xfrm>
+            <a:off x="6189996" y="1208618"/>
+            <a:ext cx="4101737" cy="469551"/>
+          </a:xfrm>
+          <a:prstGeom prst="wedgeRectCallout">
+            <a:avLst>
+              <a:gd name="adj1" fmla="val -105768"/>
+              <a:gd name="adj2" fmla="val 206931"/>
+            </a:avLst>
+          </a:prstGeom>
+          <a:ln>
+            <a:headEnd/>
+            <a:tailEnd/>
+          </a:ln>
+        </p:spPr>
+        <p:style>
+          <a:lnRef idx="2">
+            <a:schemeClr val="accent5"/>
+          </a:lnRef>
+          <a:fillRef idx="1">
+            <a:schemeClr val="lt1"/>
+          </a:fillRef>
+          <a:effectRef idx="0">
+            <a:schemeClr val="accent5"/>
+          </a:effectRef>
+          <a:fontRef idx="minor">
+            <a:schemeClr val="dk1"/>
+          </a:fontRef>
+        </p:style>
+        <p:txBody>
+          <a:bodyPr lIns="90000" tIns="72000" rIns="90000" bIns="72000" rtlCol="0" anchor="ctr"/>
+          <a:lstStyle/>
+          <a:p>
+            <a:pPr marR="0" algn="ctr" defTabSz="914400" eaLnBrk="1" fontAlgn="base" latinLnBrk="0" hangingPunct="1">
+              <a:lnSpc>
+                <a:spcPct val="100000"/>
+              </a:lnSpc>
+              <a:spcBef>
+                <a:spcPct val="50000"/>
+              </a:spcBef>
+              <a:spcAft>
+                <a:spcPct val="0"/>
+              </a:spcAft>
+              <a:buClr>
+                <a:srgbClr val="F0AB00"/>
+              </a:buClr>
+              <a:buSzPct val="80000"/>
+              <a:tabLst/>
+            </a:pPr>
+            <a:r>
+              <a:rPr lang="en-US" sz="1800" kern="0" noProof="0" dirty="0">
+                <a:ea typeface="Arial Unicode MS" pitchFamily="34" charset="-128"/>
+                <a:cs typeface="Arial Unicode MS" pitchFamily="34" charset="-128"/>
+              </a:rPr>
+              <a:t>Simple </a:t>
+            </a:r>
+            <a:r>
+              <a:rPr lang="en-US" sz="1800" kern="0" noProof="0" dirty="0" err="1">
+                <a:ea typeface="Arial Unicode MS" pitchFamily="34" charset="-128"/>
+                <a:cs typeface="Arial Unicode MS" pitchFamily="34" charset="-128"/>
+              </a:rPr>
+              <a:t>ConfigMap</a:t>
+            </a:r>
+            <a:r>
+              <a:rPr lang="en-US" sz="1800" kern="0" noProof="0" dirty="0">
+                <a:ea typeface="Arial Unicode MS" pitchFamily="34" charset="-128"/>
+                <a:cs typeface="Arial Unicode MS" pitchFamily="34" charset="-128"/>
+              </a:rPr>
+              <a:t> with specific values </a:t>
+            </a:r>
+            <a:endParaRPr kumimoji="0" lang="en-US" sz="1800" b="0" i="0" u="none" strike="noStrike" kern="0" cap="none" spc="0" normalizeH="0" baseline="0" noProof="0" dirty="0">
+              <a:ln>
+                <a:noFill/>
+              </a:ln>
+              <a:effectLst/>
+              <a:uLnTx/>
+              <a:uFillTx/>
+              <a:ea typeface="Arial Unicode MS" pitchFamily="34" charset="-128"/>
+              <a:cs typeface="Arial Unicode MS" pitchFamily="34" charset="-128"/>
+            </a:endParaRPr>
+          </a:p>
+        </p:txBody>
+      </p:sp>
+      <p:sp>
+        <p:nvSpPr>
+          <p:cNvPr id="18" name="Speech Bubble: Rectangle 17">
+            <a:extLst>
+              <a:ext uri="{FF2B5EF4-FFF2-40B4-BE49-F238E27FC236}">
+                <a16:creationId xmlns:a16="http://schemas.microsoft.com/office/drawing/2014/main" id="{ECB57014-3931-4302-B65B-412F5B56F6DB}"/>
+              </a:ext>
+            </a:extLst>
+          </p:cNvPr>
+          <p:cNvSpPr/>
+          <p:nvPr/>
+        </p:nvSpPr>
+        <p:spPr bwMode="gray">
+          <a:xfrm>
+            <a:off x="6189995" y="2412670"/>
+            <a:ext cx="4101737" cy="770145"/>
+          </a:xfrm>
+          <a:prstGeom prst="wedgeRectCallout">
+            <a:avLst>
+              <a:gd name="adj1" fmla="val -107269"/>
+              <a:gd name="adj2" fmla="val 44120"/>
+            </a:avLst>
+          </a:prstGeom>
+          <a:ln>
+            <a:headEnd/>
+            <a:tailEnd/>
+          </a:ln>
+        </p:spPr>
+        <p:style>
+          <a:lnRef idx="2">
+            <a:schemeClr val="accent5"/>
+          </a:lnRef>
+          <a:fillRef idx="1">
+            <a:schemeClr val="lt1"/>
+          </a:fillRef>
+          <a:effectRef idx="0">
+            <a:schemeClr val="accent5"/>
+          </a:effectRef>
+          <a:fontRef idx="minor">
+            <a:schemeClr val="dk1"/>
+          </a:fontRef>
+        </p:style>
+        <p:txBody>
+          <a:bodyPr lIns="90000" tIns="72000" rIns="90000" bIns="72000" rtlCol="0" anchor="ctr"/>
+          <a:lstStyle/>
+          <a:p>
+            <a:pPr marR="0" algn="ctr" defTabSz="914400" eaLnBrk="1" fontAlgn="base" latinLnBrk="0" hangingPunct="1">
+              <a:lnSpc>
+                <a:spcPct val="100000"/>
+              </a:lnSpc>
+              <a:spcBef>
+                <a:spcPct val="50000"/>
+              </a:spcBef>
+              <a:spcAft>
+                <a:spcPct val="0"/>
+              </a:spcAft>
+              <a:buClr>
+                <a:srgbClr val="F0AB00"/>
+              </a:buClr>
+              <a:buSzPct val="80000"/>
+              <a:tabLst/>
+            </a:pPr>
+            <a:r>
+              <a:rPr lang="en-US" sz="1800" kern="0" noProof="0" dirty="0" err="1">
+                <a:ea typeface="Arial Unicode MS" pitchFamily="34" charset="-128"/>
+                <a:cs typeface="Arial Unicode MS" pitchFamily="34" charset="-128"/>
+              </a:rPr>
+              <a:t>Yaml</a:t>
+            </a:r>
+            <a:r>
+              <a:rPr lang="en-US" sz="1800" kern="0" noProof="0" dirty="0">
+                <a:ea typeface="Arial Unicode MS" pitchFamily="34" charset="-128"/>
+                <a:cs typeface="Arial Unicode MS" pitchFamily="34" charset="-128"/>
+              </a:rPr>
+              <a:t> file needs to be edited each time a </a:t>
+            </a:r>
+            <a:r>
+              <a:rPr lang="en-US" sz="1800" kern="0" dirty="0">
+                <a:ea typeface="Arial Unicode MS" pitchFamily="34" charset="-128"/>
+                <a:cs typeface="Arial Unicode MS" pitchFamily="34" charset="-128"/>
+              </a:rPr>
+              <a:t>change is required</a:t>
+            </a:r>
+            <a:endParaRPr kumimoji="0" lang="en-US" sz="1800" b="0" i="0" u="none" strike="noStrike" kern="0" cap="none" spc="0" normalizeH="0" baseline="0" noProof="0" dirty="0">
+              <a:ln>
+                <a:noFill/>
+              </a:ln>
+              <a:effectLst/>
+              <a:uLnTx/>
+              <a:uFillTx/>
+              <a:ea typeface="Arial Unicode MS" pitchFamily="34" charset="-128"/>
+              <a:cs typeface="Arial Unicode MS" pitchFamily="34" charset="-128"/>
+            </a:endParaRPr>
+          </a:p>
+        </p:txBody>
+      </p:sp>
+      <p:sp>
+        <p:nvSpPr>
+          <p:cNvPr id="19" name="Speech Bubble: Rectangle 18">
+            <a:extLst>
+              <a:ext uri="{FF2B5EF4-FFF2-40B4-BE49-F238E27FC236}">
+                <a16:creationId xmlns:a16="http://schemas.microsoft.com/office/drawing/2014/main" id="{1C8D7A34-3D93-4592-83AE-3BAA44551FC3}"/>
+              </a:ext>
+            </a:extLst>
+          </p:cNvPr>
+          <p:cNvSpPr/>
+          <p:nvPr/>
+        </p:nvSpPr>
+        <p:spPr bwMode="gray">
+          <a:xfrm>
+            <a:off x="6189995" y="3917316"/>
+            <a:ext cx="4101737" cy="742607"/>
+          </a:xfrm>
+          <a:prstGeom prst="wedgeRectCallout">
+            <a:avLst>
+              <a:gd name="adj1" fmla="val -100195"/>
+              <a:gd name="adj2" fmla="val 37609"/>
+            </a:avLst>
+          </a:prstGeom>
+          <a:ln>
+            <a:headEnd/>
+            <a:tailEnd/>
+          </a:ln>
+        </p:spPr>
+        <p:style>
+          <a:lnRef idx="2">
+            <a:schemeClr val="accent5"/>
+          </a:lnRef>
+          <a:fillRef idx="1">
+            <a:schemeClr val="lt1"/>
+          </a:fillRef>
+          <a:effectRef idx="0">
+            <a:schemeClr val="accent5"/>
+          </a:effectRef>
+          <a:fontRef idx="minor">
+            <a:schemeClr val="dk1"/>
+          </a:fontRef>
+        </p:style>
+        <p:txBody>
+          <a:bodyPr lIns="90000" tIns="72000" rIns="90000" bIns="72000" rtlCol="0" anchor="ctr"/>
+          <a:lstStyle/>
+          <a:p>
+            <a:pPr marR="0" algn="ctr" defTabSz="914400" eaLnBrk="1" fontAlgn="base" latinLnBrk="0" hangingPunct="1">
+              <a:lnSpc>
+                <a:spcPct val="100000"/>
+              </a:lnSpc>
+              <a:spcBef>
+                <a:spcPct val="50000"/>
+              </a:spcBef>
+              <a:spcAft>
+                <a:spcPct val="0"/>
+              </a:spcAft>
+              <a:buClr>
+                <a:srgbClr val="F0AB00"/>
+              </a:buClr>
+              <a:buSzPct val="80000"/>
+              <a:tabLst/>
+            </a:pPr>
+            <a:r>
+              <a:rPr lang="en-US" sz="1800" kern="0" dirty="0">
+                <a:ea typeface="Arial Unicode MS" pitchFamily="34" charset="-128"/>
+                <a:cs typeface="Arial Unicode MS" pitchFamily="34" charset="-128"/>
+              </a:rPr>
+              <a:t>Helm template of a </a:t>
+            </a:r>
+            <a:r>
+              <a:rPr kumimoji="0" lang="en-US" sz="1800" b="0" i="0" u="none" strike="noStrike" kern="0" cap="none" spc="0" normalizeH="0" baseline="0" dirty="0" err="1">
+                <a:ln>
+                  <a:noFill/>
+                </a:ln>
+                <a:effectLst/>
+                <a:uLnTx/>
+                <a:uFillTx/>
+                <a:ea typeface="Arial Unicode MS" pitchFamily="34" charset="-128"/>
+                <a:cs typeface="Arial Unicode MS" pitchFamily="34" charset="-128"/>
+              </a:rPr>
+              <a:t>Config</a:t>
+            </a:r>
+            <a:r>
+              <a:rPr lang="en-US" sz="1800" kern="0" dirty="0" err="1">
+                <a:ea typeface="Arial Unicode MS" pitchFamily="34" charset="-128"/>
+                <a:cs typeface="Arial Unicode MS" pitchFamily="34" charset="-128"/>
+              </a:rPr>
+              <a:t>Map</a:t>
+            </a:r>
+            <a:r>
+              <a:rPr lang="en-US" sz="1800" kern="0" dirty="0">
+                <a:ea typeface="Arial Unicode MS" pitchFamily="34" charset="-128"/>
+                <a:cs typeface="Arial Unicode MS" pitchFamily="34" charset="-128"/>
+              </a:rPr>
+              <a:t> with variables</a:t>
+            </a:r>
+            <a:endParaRPr kumimoji="0" lang="en-US" sz="1800" b="0" i="0" u="none" strike="noStrike" kern="0" cap="none" spc="0" normalizeH="0" baseline="0" noProof="0" dirty="0">
+              <a:ln>
+                <a:noFill/>
+              </a:ln>
+              <a:effectLst/>
+              <a:uLnTx/>
+              <a:uFillTx/>
+              <a:ea typeface="Arial Unicode MS" pitchFamily="34" charset="-128"/>
+              <a:cs typeface="Arial Unicode MS" pitchFamily="34" charset="-128"/>
+            </a:endParaRPr>
+          </a:p>
+        </p:txBody>
+      </p:sp>
+      <p:sp>
+        <p:nvSpPr>
+          <p:cNvPr id="20" name="Speech Bubble: Rectangle 19">
+            <a:extLst>
+              <a:ext uri="{FF2B5EF4-FFF2-40B4-BE49-F238E27FC236}">
+                <a16:creationId xmlns:a16="http://schemas.microsoft.com/office/drawing/2014/main" id="{EBBD1CF4-C76F-407F-8290-5B2B409BBB4C}"/>
+              </a:ext>
+            </a:extLst>
+          </p:cNvPr>
+          <p:cNvSpPr/>
+          <p:nvPr/>
+        </p:nvSpPr>
+        <p:spPr bwMode="gray">
+          <a:xfrm>
+            <a:off x="6189994" y="5009351"/>
+            <a:ext cx="4101737" cy="770145"/>
+          </a:xfrm>
+          <a:prstGeom prst="wedgeRectCallout">
+            <a:avLst>
+              <a:gd name="adj1" fmla="val -85619"/>
+              <a:gd name="adj2" fmla="val -16387"/>
+            </a:avLst>
+          </a:prstGeom>
+          <a:ln>
+            <a:headEnd/>
+            <a:tailEnd/>
+          </a:ln>
+        </p:spPr>
+        <p:style>
+          <a:lnRef idx="2">
+            <a:schemeClr val="accent5"/>
+          </a:lnRef>
+          <a:fillRef idx="1">
+            <a:schemeClr val="lt1"/>
+          </a:fillRef>
+          <a:effectRef idx="0">
+            <a:schemeClr val="accent5"/>
+          </a:effectRef>
+          <a:fontRef idx="minor">
+            <a:schemeClr val="dk1"/>
+          </a:fontRef>
+        </p:style>
+        <p:txBody>
+          <a:bodyPr lIns="90000" tIns="72000" rIns="90000" bIns="72000" rtlCol="0" anchor="ctr"/>
+          <a:lstStyle/>
+          <a:p>
+            <a:pPr marR="0" algn="ctr" defTabSz="914400" eaLnBrk="1" fontAlgn="base" latinLnBrk="0" hangingPunct="1">
+              <a:lnSpc>
+                <a:spcPct val="100000"/>
+              </a:lnSpc>
+              <a:spcBef>
+                <a:spcPct val="50000"/>
+              </a:spcBef>
+              <a:spcAft>
+                <a:spcPct val="0"/>
+              </a:spcAft>
+              <a:buClr>
+                <a:srgbClr val="F0AB00"/>
+              </a:buClr>
+              <a:buSzPct val="80000"/>
+              <a:tabLst/>
+            </a:pPr>
+            <a:r>
+              <a:rPr kumimoji="0" lang="en-US" sz="1800" b="0" i="0" u="none" strike="noStrike" kern="0" cap="none" spc="0" normalizeH="0" baseline="0" dirty="0">
+                <a:ln>
+                  <a:noFill/>
+                </a:ln>
+                <a:effectLst/>
+                <a:uLnTx/>
+                <a:uFillTx/>
+                <a:ea typeface="Arial Unicode MS" pitchFamily="34" charset="-128"/>
+                <a:cs typeface="Arial Unicode MS" pitchFamily="34" charset="-128"/>
+              </a:rPr>
+              <a:t>Variables are </a:t>
+            </a:r>
+            <a:r>
+              <a:rPr lang="en-US" sz="1800" kern="0" dirty="0">
+                <a:ea typeface="Arial Unicode MS" pitchFamily="34" charset="-128"/>
+                <a:cs typeface="Arial Unicode MS" pitchFamily="34" charset="-128"/>
+              </a:rPr>
+              <a:t>converted to specific values upon installation of the chart</a:t>
+            </a:r>
+            <a:endParaRPr kumimoji="0" lang="en-US" sz="1800" b="0" i="0" u="none" strike="noStrike" kern="0" cap="none" spc="0" normalizeH="0" baseline="0" noProof="0" dirty="0">
+              <a:ln>
+                <a:noFill/>
+              </a:ln>
+              <a:effectLst/>
+              <a:uLnTx/>
+              <a:uFillTx/>
+              <a:ea typeface="Arial Unicode MS" pitchFamily="34" charset="-128"/>
+              <a:cs typeface="Arial Unicode MS" pitchFamily="34" charset="-128"/>
+            </a:endParaRPr>
+          </a:p>
+        </p:txBody>
+      </p:sp>
+    </p:spTree>
+    <p:extLst>
+      <p:ext uri="{BB962C8B-B14F-4D97-AF65-F5344CB8AC3E}">
+        <p14:creationId xmlns:p14="http://schemas.microsoft.com/office/powerpoint/2010/main" val="1378125413"/>
+      </p:ext>
+    </p:extLst>
+  </p:cSld>
+  <p:clrMapOvr>
+    <a:masterClrMapping/>
+  </p:clrMapOvr>
+</p:sld>
+</file>
+
+<file path=ppt/slides/slide9.xml><?xml version="1.0" encoding="utf-8"?>
+<p:sld xmlns:a="http://schemas.openxmlformats.org/drawingml/2006/main" xmlns:r="http://schemas.openxmlformats.org/officeDocument/2006/relationships" xmlns:p="http://schemas.openxmlformats.org/presentationml/2006/main" show="0">
+  <p:cSld>
+    <p:spTree>
+      <p:nvGrpSpPr>
+        <p:cNvPr id="1" name=""/>
+        <p:cNvGrpSpPr/>
+        <p:nvPr/>
+      </p:nvGrpSpPr>
+      <p:grpSpPr>
+        <a:xfrm>
+          <a:off x="0" y="0"/>
+          <a:ext cx="0" cy="0"/>
+          <a:chOff x="0" y="0"/>
+          <a:chExt cx="0" cy="0"/>
+        </a:xfrm>
+      </p:grpSpPr>
+      <p:sp>
+        <p:nvSpPr>
+          <p:cNvPr id="6" name="Text Placeholder 5">
+            <a:extLst>
+              <a:ext uri="{FF2B5EF4-FFF2-40B4-BE49-F238E27FC236}">
+                <a16:creationId xmlns:a16="http://schemas.microsoft.com/office/drawing/2014/main" id="{920D95D6-6510-4E95-B39D-F186652A1A46}"/>
+              </a:ext>
+            </a:extLst>
+          </p:cNvPr>
+          <p:cNvSpPr>
+            <a:spLocks noGrp="1"/>
+          </p:cNvSpPr>
+          <p:nvPr>
+            <p:ph type="body" sz="quarter" idx="10"/>
+          </p:nvPr>
+        </p:nvSpPr>
+        <p:spPr>
+          <a:xfrm>
+            <a:off x="504000" y="1101253"/>
+            <a:ext cx="11186477" cy="4230000"/>
+          </a:xfrm>
+        </p:spPr>
+        <p:txBody>
+          <a:bodyPr/>
+          <a:lstStyle/>
+          <a:p>
+            <a:pPr marL="342900" indent="-342900">
+              <a:buFontTx/>
+              <a:buChar char="-"/>
+            </a:pPr>
+            <a:r>
+              <a:rPr lang="en-US" sz="1800" dirty="0"/>
+              <a:t>Go to the k8s demo folder </a:t>
+            </a:r>
+            <a:r>
+              <a:rPr lang="en-US" sz="1800" dirty="0">
+                <a:sym typeface="Wingdings" panose="05000000000000000000" pitchFamily="2" charset="2"/>
+              </a:rPr>
+              <a:t>and continue with demo-chart</a:t>
+            </a:r>
+          </a:p>
+          <a:p>
+            <a:pPr marL="522864" lvl="1" indent="-342900">
+              <a:buFontTx/>
+              <a:buChar char="-"/>
+            </a:pPr>
+            <a:r>
+              <a:rPr lang="en-US" sz="1600" dirty="0"/>
+              <a:t>Show the content of the template subfolder, starting with the specific-</a:t>
+            </a:r>
+            <a:r>
+              <a:rPr lang="en-US" sz="1600" dirty="0" err="1"/>
+              <a:t>configmap.yaml</a:t>
+            </a:r>
+            <a:endParaRPr lang="en-US" sz="1600" dirty="0"/>
+          </a:p>
+          <a:p>
+            <a:pPr marL="522864" lvl="1" indent="-342900">
+              <a:buFontTx/>
+              <a:buChar char="-"/>
+            </a:pPr>
+            <a:r>
+              <a:rPr lang="en-US" sz="1600" dirty="0"/>
+              <a:t>Show the flexible-</a:t>
+            </a:r>
+            <a:r>
+              <a:rPr lang="en-US" sz="1600" dirty="0" err="1"/>
+              <a:t>configmap.yaml</a:t>
+            </a:r>
+            <a:r>
+              <a:rPr lang="en-US" sz="1600" dirty="0"/>
+              <a:t> and explain the build in variables, values references + _</a:t>
+            </a:r>
+            <a:r>
+              <a:rPr lang="en-US" sz="1600" dirty="0" err="1"/>
+              <a:t>helpers.tpl</a:t>
+            </a:r>
+            <a:r>
+              <a:rPr lang="en-US" sz="1600" dirty="0"/>
+              <a:t> where the functions are defined</a:t>
+            </a:r>
+          </a:p>
+          <a:p>
+            <a:pPr marL="522864" lvl="1" indent="-342900">
+              <a:buFontTx/>
+              <a:buChar char="-"/>
+            </a:pPr>
+            <a:r>
+              <a:rPr lang="en-US" sz="1600" dirty="0"/>
+              <a:t>Show NOTES.txt -&gt; it contains the lines to print after a successful deployment</a:t>
+            </a:r>
+          </a:p>
+          <a:p>
+            <a:pPr marL="522864" lvl="1" indent="-342900">
+              <a:buFontTx/>
+              <a:buChar char="-"/>
+            </a:pPr>
+            <a:r>
+              <a:rPr lang="en-US" sz="1600" dirty="0"/>
+              <a:t>Show the values file in the demo-chart folder</a:t>
+            </a:r>
+          </a:p>
+          <a:p>
+            <a:pPr marL="342900" indent="-342900">
+              <a:buFontTx/>
+              <a:buChar char="-"/>
+            </a:pPr>
+            <a:r>
+              <a:rPr lang="en-US" sz="1800" dirty="0"/>
+              <a:t>Deploy the chart: “helm install .” (assuming your current working directory is ./demo-chart )</a:t>
+            </a:r>
+          </a:p>
+          <a:p>
+            <a:pPr marL="522864" lvl="1" indent="-342900">
+              <a:buFontTx/>
+              <a:buChar char="-"/>
+            </a:pPr>
+            <a:r>
+              <a:rPr lang="en-US" sz="1600" dirty="0"/>
+              <a:t> run the commands that have been printed by helm</a:t>
+            </a:r>
+          </a:p>
+          <a:p>
+            <a:pPr marL="342900" indent="-342900">
+              <a:buFontTx/>
+              <a:buChar char="-"/>
+            </a:pPr>
+            <a:r>
+              <a:rPr lang="en-US" sz="1800" dirty="0"/>
+              <a:t>Update the release and change the value of </a:t>
+            </a:r>
+            <a:r>
+              <a:rPr lang="en-US" sz="1800" dirty="0" err="1"/>
+              <a:t>myMessage</a:t>
+            </a:r>
+            <a:r>
+              <a:rPr lang="en-US" sz="1800" dirty="0"/>
+              <a:t>, use dry-run and debug to double check changes: </a:t>
+            </a:r>
+          </a:p>
+          <a:p>
+            <a:pPr marL="522864" lvl="1" indent="-342900">
+              <a:buFontTx/>
+              <a:buChar char="-"/>
+            </a:pPr>
+            <a:r>
+              <a:rPr lang="en-US" sz="1600" dirty="0"/>
+              <a:t>helm upgrade --dry-run --debug --set </a:t>
+            </a:r>
+            <a:r>
+              <a:rPr lang="en-US" sz="1600" dirty="0" err="1"/>
+              <a:t>myMessage</a:t>
+            </a:r>
+            <a:r>
+              <a:rPr lang="en-US" sz="1600" dirty="0"/>
+              <a:t>=“Goodbye course” &lt;release name&gt; .</a:t>
+            </a:r>
+          </a:p>
+          <a:p>
+            <a:pPr marL="522864" lvl="1" indent="-342900">
+              <a:buFontTx/>
+              <a:buChar char="-"/>
+            </a:pPr>
+            <a:r>
+              <a:rPr lang="en-US" sz="1600" dirty="0"/>
+              <a:t>helm upgrade --set </a:t>
+            </a:r>
+            <a:r>
+              <a:rPr lang="en-US" sz="1600" dirty="0" err="1"/>
+              <a:t>myMessage</a:t>
+            </a:r>
+            <a:r>
+              <a:rPr lang="en-US" sz="1600" dirty="0"/>
+              <a:t>=“Goodbye course” &lt;release name&gt; .</a:t>
+            </a:r>
+          </a:p>
+          <a:p>
+            <a:pPr marL="342900" indent="-342900">
+              <a:buFontTx/>
+              <a:buChar char="-"/>
+            </a:pPr>
+            <a:r>
+              <a:rPr lang="en-US" sz="1800" dirty="0"/>
+              <a:t>Update the release with a </a:t>
+            </a:r>
+            <a:r>
+              <a:rPr lang="en-US" sz="1800" dirty="0" err="1"/>
+              <a:t>custom_values.yaml</a:t>
+            </a:r>
+            <a:endParaRPr lang="en-US" sz="1800" dirty="0"/>
+          </a:p>
+          <a:p>
+            <a:pPr marL="522864" lvl="1" indent="-342900">
+              <a:buFontTx/>
+              <a:buChar char="-"/>
+            </a:pPr>
+            <a:r>
+              <a:rPr lang="en-US" sz="1600" dirty="0"/>
+              <a:t>Helm upgrade –f </a:t>
+            </a:r>
+            <a:r>
+              <a:rPr lang="en-US" sz="1600" dirty="0" err="1"/>
+              <a:t>custom_values.yaml</a:t>
+            </a:r>
+            <a:r>
+              <a:rPr lang="en-US" sz="1600" dirty="0"/>
+              <a:t> &lt;release name&gt; .</a:t>
+            </a:r>
+          </a:p>
+          <a:p>
+            <a:pPr lvl="1" indent="0">
+              <a:buNone/>
+            </a:pPr>
+            <a:r>
+              <a:rPr lang="en-US" b="1" dirty="0"/>
+              <a:t>“.” is referencing a relative path to your chart – don’t truncate it!</a:t>
+            </a:r>
+          </a:p>
+        </p:txBody>
+      </p:sp>
+      <p:sp>
+        <p:nvSpPr>
+          <p:cNvPr id="5" name="Title 4">
+            <a:extLst>
+              <a:ext uri="{FF2B5EF4-FFF2-40B4-BE49-F238E27FC236}">
+                <a16:creationId xmlns:a16="http://schemas.microsoft.com/office/drawing/2014/main" id="{17C5E0DC-58DA-4279-A937-C304F691FF25}"/>
+              </a:ext>
+            </a:extLst>
+          </p:cNvPr>
+          <p:cNvSpPr>
+            <a:spLocks noGrp="1"/>
+          </p:cNvSpPr>
+          <p:nvPr>
+            <p:ph type="title"/>
+          </p:nvPr>
+        </p:nvSpPr>
+        <p:spPr/>
+        <p:txBody>
+          <a:bodyPr/>
+          <a:lstStyle/>
+          <a:p>
+            <a:r>
+              <a:rPr lang="en-US" dirty="0"/>
+              <a:t>Demo script</a:t>
+            </a:r>
+          </a:p>
+        </p:txBody>
+      </p:sp>
+    </p:spTree>
+    <p:extLst>
+      <p:ext uri="{BB962C8B-B14F-4D97-AF65-F5344CB8AC3E}">
+        <p14:creationId xmlns:p14="http://schemas.microsoft.com/office/powerpoint/2010/main" val="4159007378"/>
+      </p:ext>
+    </p:extLst>
+  </p:cSld>
+  <p:clrMapOvr>
+    <a:masterClrMapping/>
+  </p:clrMapOvr>
 </p:sld>
 </file>
 

</xml_diff>